<commit_message>
apply polymorphism by infect() method, modify slides and report
</commit_message>
<xml_diff>
--- a/Presentation/presentation.pptx
+++ b/Presentation/presentation.pptx
@@ -5,10 +5,10 @@
     <p:sldMasterId id="2147483648" r:id="rId4"/>
   </p:sldMasterIdLst>
   <p:notesMasterIdLst>
-    <p:notesMasterId r:id="rId15"/>
+    <p:notesMasterId r:id="rId18"/>
   </p:notesMasterIdLst>
   <p:handoutMasterIdLst>
-    <p:handoutMasterId r:id="rId16"/>
+    <p:handoutMasterId r:id="rId19"/>
   </p:handoutMasterIdLst>
   <p:sldIdLst>
     <p:sldId id="256" r:id="rId5"/>
@@ -19,8 +19,11 @@
     <p:sldId id="258" r:id="rId10"/>
     <p:sldId id="2442" r:id="rId11"/>
     <p:sldId id="2433" r:id="rId12"/>
-    <p:sldId id="2438" r:id="rId13"/>
-    <p:sldId id="2441" r:id="rId14"/>
+    <p:sldId id="2443" r:id="rId13"/>
+    <p:sldId id="2444" r:id="rId14"/>
+    <p:sldId id="2445" r:id="rId15"/>
+    <p:sldId id="2438" r:id="rId16"/>
+    <p:sldId id="2441" r:id="rId17"/>
   </p:sldIdLst>
   <p:sldSz cx="12192000" cy="6858000"/>
   <p:notesSz cx="6858000" cy="9144000"/>
@@ -224,7 +227,7 @@
           <a:p>
             <a:fld id="{D1CB9CF0-A540-4793-A5F3-F4917CFDDCB6}" type="datetimeFigureOut">
               <a:rPr lang="en-US" smtClean="0"/>
-              <a:t>7/5/2022</a:t>
+              <a:t>7/13/2022</a:t>
             </a:fld>
             <a:endParaRPr lang="en-US" dirty="0"/>
           </a:p>
@@ -401,7 +404,7 @@
           <a:p>
             <a:fld id="{EDA03753-A5BE-4D79-AEA9-C0A65A6F8851}" type="datetimeFigureOut">
               <a:rPr lang="en-US" smtClean="0"/>
-              <a:t>7/5/2022</a:t>
+              <a:t>7/13/2022</a:t>
             </a:fld>
             <a:endParaRPr lang="en-US" dirty="0"/>
           </a:p>
@@ -901,7 +904,7 @@
           <a:p>
             <a:fld id="{AA3BE989-76B8-4F13-9267-01FDA45C437A}" type="slidenum">
               <a:rPr lang="en-US" smtClean="0"/>
-              <a:t>9</a:t>
+              <a:t>12</a:t>
             </a:fld>
             <a:endParaRPr lang="en-US" dirty="0"/>
           </a:p>
@@ -10641,6 +10644,834 @@
 <file path=ppt/slides/slide10.xml><?xml version="1.0" encoding="utf-8"?>
 <p:sld xmlns:a="http://schemas.openxmlformats.org/drawingml/2006/main" xmlns:r="http://schemas.openxmlformats.org/officeDocument/2006/relationships" xmlns:p="http://schemas.openxmlformats.org/presentationml/2006/main">
   <p:cSld>
+    <p:spTree>
+      <p:nvGrpSpPr>
+        <p:cNvPr id="1" name=""/>
+        <p:cNvGrpSpPr/>
+        <p:nvPr/>
+      </p:nvGrpSpPr>
+      <p:grpSpPr>
+        <a:xfrm>
+          <a:off x="0" y="0"/>
+          <a:ext cx="0" cy="0"/>
+          <a:chOff x="0" y="0"/>
+          <a:chExt cx="0" cy="0"/>
+        </a:xfrm>
+      </p:grpSpPr>
+      <p:sp>
+        <p:nvSpPr>
+          <p:cNvPr id="12" name="Rectangle 11">
+            <a:extLst>
+              <a:ext uri="{FF2B5EF4-FFF2-40B4-BE49-F238E27FC236}">
+                <a16:creationId xmlns:a16="http://schemas.microsoft.com/office/drawing/2014/main" id="{209544CB-5CBD-F3F5-A576-674C2C46E735}"/>
+              </a:ext>
+              <a:ext uri="{C183D7F6-B498-43B3-948B-1728B52AA6E4}">
+                <adec:decorative xmlns:adec="http://schemas.microsoft.com/office/drawing/2017/decorative" val="1"/>
+              </a:ext>
+            </a:extLst>
+          </p:cNvPr>
+          <p:cNvSpPr/>
+          <p:nvPr/>
+        </p:nvSpPr>
+        <p:spPr>
+          <a:xfrm>
+            <a:off x="1" y="1"/>
+            <a:ext cx="12192000" cy="6858000"/>
+          </a:xfrm>
+          <a:prstGeom prst="rect">
+            <a:avLst/>
+          </a:prstGeom>
+          <a:solidFill>
+            <a:srgbClr val="2F3342"/>
+          </a:solidFill>
+          <a:ln>
+            <a:noFill/>
+          </a:ln>
+          <a:effectLst/>
+        </p:spPr>
+        <p:style>
+          <a:lnRef idx="2">
+            <a:schemeClr val="accent1">
+              <a:shade val="50000"/>
+            </a:schemeClr>
+          </a:lnRef>
+          <a:fillRef idx="1">
+            <a:schemeClr val="accent1"/>
+          </a:fillRef>
+          <a:effectRef idx="0">
+            <a:schemeClr val="accent1"/>
+          </a:effectRef>
+          <a:fontRef idx="minor">
+            <a:schemeClr val="lt1"/>
+          </a:fontRef>
+        </p:style>
+        <p:txBody>
+          <a:bodyPr rtlCol="0" anchor="ctr"/>
+          <a:lstStyle/>
+          <a:p>
+            <a:pPr algn="ctr"/>
+            <a:endParaRPr lang="en-US" dirty="0"/>
+          </a:p>
+        </p:txBody>
+      </p:sp>
+      <p:sp>
+        <p:nvSpPr>
+          <p:cNvPr id="7" name="Title 6">
+            <a:extLst>
+              <a:ext uri="{FF2B5EF4-FFF2-40B4-BE49-F238E27FC236}">
+                <a16:creationId xmlns:a16="http://schemas.microsoft.com/office/drawing/2014/main" id="{4D671F4D-9614-41E9-BA0C-7977DEBBBBB3}"/>
+              </a:ext>
+            </a:extLst>
+          </p:cNvPr>
+          <p:cNvSpPr>
+            <a:spLocks noGrp="1"/>
+          </p:cNvSpPr>
+          <p:nvPr>
+            <p:ph type="title"/>
+          </p:nvPr>
+        </p:nvSpPr>
+        <p:spPr>
+          <a:xfrm>
+            <a:off x="-168894" y="24572"/>
+            <a:ext cx="12360894" cy="851728"/>
+          </a:xfrm>
+        </p:spPr>
+        <p:txBody>
+          <a:bodyPr>
+            <a:normAutofit/>
+          </a:bodyPr>
+          <a:lstStyle/>
+          <a:p>
+            <a:r>
+              <a:rPr lang="en-US" dirty="0"/>
+              <a:t>VIRUS With </a:t>
+            </a:r>
+            <a:r>
+              <a:rPr lang="en-US" dirty="0" err="1"/>
+              <a:t>ENVelope</a:t>
+            </a:r>
+            <a:r>
+              <a:rPr lang="en-US" dirty="0"/>
+              <a:t> pack</a:t>
+            </a:r>
+          </a:p>
+        </p:txBody>
+      </p:sp>
+      <p:pic>
+        <p:nvPicPr>
+          <p:cNvPr id="4" name="Picture 3" descr="A picture containing text&#10;&#10;Description automatically generated">
+            <a:extLst>
+              <a:ext uri="{FF2B5EF4-FFF2-40B4-BE49-F238E27FC236}">
+                <a16:creationId xmlns:a16="http://schemas.microsoft.com/office/drawing/2014/main" id="{CAC63DAD-CFB0-900C-64D8-1C1D3B35AD15}"/>
+              </a:ext>
+            </a:extLst>
+          </p:cNvPr>
+          <p:cNvPicPr>
+            <a:picLocks noChangeAspect="1"/>
+          </p:cNvPicPr>
+          <p:nvPr/>
+        </p:nvPicPr>
+        <p:blipFill>
+          <a:blip r:embed="rId2"/>
+          <a:stretch>
+            <a:fillRect/>
+          </a:stretch>
+        </p:blipFill>
+        <p:spPr>
+          <a:xfrm>
+            <a:off x="2171752" y="770980"/>
+            <a:ext cx="7848495" cy="5962731"/>
+          </a:xfrm>
+          <a:prstGeom prst="rect">
+            <a:avLst/>
+          </a:prstGeom>
+        </p:spPr>
+      </p:pic>
+    </p:spTree>
+    <p:extLst>
+      <p:ext uri="{BB962C8B-B14F-4D97-AF65-F5344CB8AC3E}">
+        <p14:creationId xmlns:p14="http://schemas.microsoft.com/office/powerpoint/2010/main" val="590715432"/>
+      </p:ext>
+    </p:extLst>
+  </p:cSld>
+  <p:clrMapOvr>
+    <a:masterClrMapping/>
+  </p:clrMapOvr>
+</p:sld>
+</file>
+
+<file path=ppt/slides/slide11.xml><?xml version="1.0" encoding="utf-8"?>
+<p:sld xmlns:a="http://schemas.openxmlformats.org/drawingml/2006/main" xmlns:r="http://schemas.openxmlformats.org/officeDocument/2006/relationships" xmlns:p="http://schemas.openxmlformats.org/presentationml/2006/main">
+  <p:cSld>
+    <p:spTree>
+      <p:nvGrpSpPr>
+        <p:cNvPr id="1" name=""/>
+        <p:cNvGrpSpPr/>
+        <p:nvPr/>
+      </p:nvGrpSpPr>
+      <p:grpSpPr>
+        <a:xfrm>
+          <a:off x="0" y="0"/>
+          <a:ext cx="0" cy="0"/>
+          <a:chOff x="0" y="0"/>
+          <a:chExt cx="0" cy="0"/>
+        </a:xfrm>
+      </p:grpSpPr>
+      <p:sp>
+        <p:nvSpPr>
+          <p:cNvPr id="12" name="Rectangle 11">
+            <a:extLst>
+              <a:ext uri="{FF2B5EF4-FFF2-40B4-BE49-F238E27FC236}">
+                <a16:creationId xmlns:a16="http://schemas.microsoft.com/office/drawing/2014/main" id="{209544CB-5CBD-F3F5-A576-674C2C46E735}"/>
+              </a:ext>
+              <a:ext uri="{C183D7F6-B498-43B3-948B-1728B52AA6E4}">
+                <adec:decorative xmlns:adec="http://schemas.microsoft.com/office/drawing/2017/decorative" val="1"/>
+              </a:ext>
+            </a:extLst>
+          </p:cNvPr>
+          <p:cNvSpPr/>
+          <p:nvPr/>
+        </p:nvSpPr>
+        <p:spPr>
+          <a:xfrm>
+            <a:off x="1" y="1"/>
+            <a:ext cx="12192000" cy="6858000"/>
+          </a:xfrm>
+          <a:prstGeom prst="rect">
+            <a:avLst/>
+          </a:prstGeom>
+          <a:solidFill>
+            <a:srgbClr val="2F3342"/>
+          </a:solidFill>
+          <a:ln>
+            <a:noFill/>
+          </a:ln>
+          <a:effectLst/>
+        </p:spPr>
+        <p:style>
+          <a:lnRef idx="2">
+            <a:schemeClr val="accent1">
+              <a:shade val="50000"/>
+            </a:schemeClr>
+          </a:lnRef>
+          <a:fillRef idx="1">
+            <a:schemeClr val="accent1"/>
+          </a:fillRef>
+          <a:effectRef idx="0">
+            <a:schemeClr val="accent1"/>
+          </a:effectRef>
+          <a:fontRef idx="minor">
+            <a:schemeClr val="lt1"/>
+          </a:fontRef>
+        </p:style>
+        <p:txBody>
+          <a:bodyPr rtlCol="0" anchor="ctr"/>
+          <a:lstStyle/>
+          <a:p>
+            <a:pPr algn="ctr"/>
+            <a:endParaRPr lang="en-US" dirty="0"/>
+          </a:p>
+        </p:txBody>
+      </p:sp>
+      <p:sp>
+        <p:nvSpPr>
+          <p:cNvPr id="7" name="Title 6">
+            <a:extLst>
+              <a:ext uri="{FF2B5EF4-FFF2-40B4-BE49-F238E27FC236}">
+                <a16:creationId xmlns:a16="http://schemas.microsoft.com/office/drawing/2014/main" id="{4D671F4D-9614-41E9-BA0C-7977DEBBBBB3}"/>
+              </a:ext>
+            </a:extLst>
+          </p:cNvPr>
+          <p:cNvSpPr>
+            <a:spLocks noGrp="1"/>
+          </p:cNvSpPr>
+          <p:nvPr>
+            <p:ph type="title"/>
+          </p:nvPr>
+        </p:nvSpPr>
+        <p:spPr>
+          <a:xfrm>
+            <a:off x="-168894" y="24572"/>
+            <a:ext cx="12360894" cy="851728"/>
+          </a:xfrm>
+        </p:spPr>
+        <p:txBody>
+          <a:bodyPr>
+            <a:normAutofit/>
+          </a:bodyPr>
+          <a:lstStyle/>
+          <a:p>
+            <a:r>
+              <a:rPr lang="en-US" dirty="0"/>
+              <a:t>VIRUS Without </a:t>
+            </a:r>
+            <a:r>
+              <a:rPr lang="en-US" dirty="0" err="1"/>
+              <a:t>ENVelope</a:t>
+            </a:r>
+            <a:r>
+              <a:rPr lang="en-US" dirty="0"/>
+              <a:t> pack</a:t>
+            </a:r>
+          </a:p>
+        </p:txBody>
+      </p:sp>
+      <p:pic>
+        <p:nvPicPr>
+          <p:cNvPr id="4" name="Picture 3" descr="A picture containing diagram&#10;&#10;Description automatically generated">
+            <a:extLst>
+              <a:ext uri="{FF2B5EF4-FFF2-40B4-BE49-F238E27FC236}">
+                <a16:creationId xmlns:a16="http://schemas.microsoft.com/office/drawing/2014/main" id="{877F48BD-860A-317C-1687-BCF92D6CA842}"/>
+              </a:ext>
+            </a:extLst>
+          </p:cNvPr>
+          <p:cNvPicPr>
+            <a:picLocks noChangeAspect="1"/>
+          </p:cNvPicPr>
+          <p:nvPr/>
+        </p:nvPicPr>
+        <p:blipFill>
+          <a:blip r:embed="rId2"/>
+          <a:stretch>
+            <a:fillRect/>
+          </a:stretch>
+        </p:blipFill>
+        <p:spPr>
+          <a:xfrm>
+            <a:off x="2417043" y="876300"/>
+            <a:ext cx="7189019" cy="5832056"/>
+          </a:xfrm>
+          <a:prstGeom prst="rect">
+            <a:avLst/>
+          </a:prstGeom>
+        </p:spPr>
+      </p:pic>
+    </p:spTree>
+    <p:extLst>
+      <p:ext uri="{BB962C8B-B14F-4D97-AF65-F5344CB8AC3E}">
+        <p14:creationId xmlns:p14="http://schemas.microsoft.com/office/powerpoint/2010/main" val="1284284832"/>
+      </p:ext>
+    </p:extLst>
+  </p:cSld>
+  <p:clrMapOvr>
+    <a:masterClrMapping/>
+  </p:clrMapOvr>
+</p:sld>
+</file>
+
+<file path=ppt/slides/slide12.xml><?xml version="1.0" encoding="utf-8"?>
+<p:sld xmlns:a="http://schemas.openxmlformats.org/drawingml/2006/main" xmlns:r="http://schemas.openxmlformats.org/officeDocument/2006/relationships" xmlns:p="http://schemas.openxmlformats.org/presentationml/2006/main">
+  <p:cSld>
+    <p:spTree>
+      <p:nvGrpSpPr>
+        <p:cNvPr id="1" name=""/>
+        <p:cNvGrpSpPr/>
+        <p:nvPr/>
+      </p:nvGrpSpPr>
+      <p:grpSpPr>
+        <a:xfrm>
+          <a:off x="0" y="0"/>
+          <a:ext cx="0" cy="0"/>
+          <a:chOff x="0" y="0"/>
+          <a:chExt cx="0" cy="0"/>
+        </a:xfrm>
+      </p:grpSpPr>
+      <p:sp>
+        <p:nvSpPr>
+          <p:cNvPr id="8" name="Title 7" hidden="1">
+            <a:extLst>
+              <a:ext uri="{FF2B5EF4-FFF2-40B4-BE49-F238E27FC236}">
+                <a16:creationId xmlns:a16="http://schemas.microsoft.com/office/drawing/2014/main" id="{097D2725-75F4-45AA-950F-2F67BBF8F754}"/>
+              </a:ext>
+            </a:extLst>
+          </p:cNvPr>
+          <p:cNvSpPr>
+            <a:spLocks noGrp="1"/>
+          </p:cNvSpPr>
+          <p:nvPr>
+            <p:ph type="title"/>
+          </p:nvPr>
+        </p:nvSpPr>
+        <p:spPr>
+          <a:xfrm>
+            <a:off x="595884" y="0"/>
+            <a:ext cx="11000232" cy="1188720"/>
+          </a:xfrm>
+        </p:spPr>
+        <p:txBody>
+          <a:bodyPr/>
+          <a:lstStyle/>
+          <a:p>
+            <a:r>
+              <a:rPr lang="en-US" dirty="0"/>
+              <a:t>Title:</a:t>
+            </a:r>
+          </a:p>
+        </p:txBody>
+      </p:sp>
+      <p:pic>
+        <p:nvPicPr>
+          <p:cNvPr id="5" name="Picture Placeholder 4" descr="Abstract Building" title="Abstract Building">
+            <a:extLst>
+              <a:ext uri="{FF2B5EF4-FFF2-40B4-BE49-F238E27FC236}">
+                <a16:creationId xmlns:a16="http://schemas.microsoft.com/office/drawing/2014/main" id="{A0DC386B-E165-424D-B694-E2C45FFA4071}"/>
+              </a:ext>
+            </a:extLst>
+          </p:cNvPr>
+          <p:cNvPicPr>
+            <a:picLocks noGrp="1" noChangeAspect="1"/>
+          </p:cNvPicPr>
+          <p:nvPr>
+            <p:ph type="pic" sz="quarter" idx="10"/>
+          </p:nvPr>
+        </p:nvPicPr>
+        <p:blipFill>
+          <a:blip r:embed="rId3">
+            <a:extLst>
+              <a:ext uri="{28A0092B-C50C-407E-A947-70E740481C1C}">
+                <a14:useLocalDpi xmlns:a14="http://schemas.microsoft.com/office/drawing/2010/main" val="0"/>
+              </a:ext>
+            </a:extLst>
+          </a:blip>
+          <a:srcRect/>
+          <a:stretch>
+            <a:fillRect/>
+          </a:stretch>
+        </p:blipFill>
+        <p:spPr/>
+      </p:pic>
+      <p:sp>
+        <p:nvSpPr>
+          <p:cNvPr id="14" name="Rectangle 13">
+            <a:extLst>
+              <a:ext uri="{FF2B5EF4-FFF2-40B4-BE49-F238E27FC236}">
+                <a16:creationId xmlns:a16="http://schemas.microsoft.com/office/drawing/2014/main" id="{3C1F0EB8-D260-4FB6-ACF6-6E86B9A02919}"/>
+              </a:ext>
+              <a:ext uri="{C183D7F6-B498-43B3-948B-1728B52AA6E4}">
+                <adec:decorative xmlns:adec="http://schemas.microsoft.com/office/drawing/2017/decorative" val="1"/>
+              </a:ext>
+            </a:extLst>
+          </p:cNvPr>
+          <p:cNvSpPr/>
+          <p:nvPr/>
+        </p:nvSpPr>
+        <p:spPr>
+          <a:xfrm>
+            <a:off x="864679" y="242207"/>
+            <a:ext cx="11181141" cy="6066255"/>
+          </a:xfrm>
+          <a:prstGeom prst="rect">
+            <a:avLst/>
+          </a:prstGeom>
+          <a:solidFill>
+            <a:srgbClr val="2F3342"/>
+          </a:solidFill>
+          <a:ln>
+            <a:noFill/>
+          </a:ln>
+          <a:effectLst/>
+        </p:spPr>
+        <p:style>
+          <a:lnRef idx="2">
+            <a:schemeClr val="accent1">
+              <a:shade val="50000"/>
+            </a:schemeClr>
+          </a:lnRef>
+          <a:fillRef idx="1">
+            <a:schemeClr val="accent1"/>
+          </a:fillRef>
+          <a:effectRef idx="0">
+            <a:schemeClr val="accent1"/>
+          </a:effectRef>
+          <a:fontRef idx="minor">
+            <a:schemeClr val="lt1"/>
+          </a:fontRef>
+        </p:style>
+        <p:txBody>
+          <a:bodyPr rtlCol="0" anchor="ctr"/>
+          <a:lstStyle/>
+          <a:p>
+            <a:pPr algn="ctr"/>
+            <a:endParaRPr lang="en-US" dirty="0"/>
+          </a:p>
+        </p:txBody>
+      </p:sp>
+      <p:sp>
+        <p:nvSpPr>
+          <p:cNvPr id="15" name="Rectangle 14">
+            <a:extLst>
+              <a:ext uri="{FF2B5EF4-FFF2-40B4-BE49-F238E27FC236}">
+                <a16:creationId xmlns:a16="http://schemas.microsoft.com/office/drawing/2014/main" id="{76D4BFC2-69CA-4ED6-89E7-A9ADB571E7A4}"/>
+              </a:ext>
+            </a:extLst>
+          </p:cNvPr>
+          <p:cNvSpPr/>
+          <p:nvPr/>
+        </p:nvSpPr>
+        <p:spPr>
+          <a:xfrm>
+            <a:off x="1302369" y="4065464"/>
+            <a:ext cx="4423315" cy="1738307"/>
+          </a:xfrm>
+          <a:prstGeom prst="rect">
+            <a:avLst/>
+          </a:prstGeom>
+          <a:noFill/>
+          <a:ln>
+            <a:noFill/>
+          </a:ln>
+        </p:spPr>
+        <p:style>
+          <a:lnRef idx="2">
+            <a:schemeClr val="accent1">
+              <a:shade val="50000"/>
+            </a:schemeClr>
+          </a:lnRef>
+          <a:fillRef idx="1">
+            <a:schemeClr val="accent1"/>
+          </a:fillRef>
+          <a:effectRef idx="0">
+            <a:schemeClr val="accent1"/>
+          </a:effectRef>
+          <a:fontRef idx="minor">
+            <a:schemeClr val="lt1"/>
+          </a:fontRef>
+        </p:style>
+        <p:txBody>
+          <a:bodyPr lIns="274320" rIns="91440" rtlCol="0" anchor="ctr"/>
+          <a:lstStyle/>
+          <a:p>
+            <a:pPr>
+              <a:lnSpc>
+                <a:spcPct val="80000"/>
+              </a:lnSpc>
+              <a:defRPr sz="10000">
+                <a:solidFill>
+                  <a:srgbClr val="3A3B39"/>
+                </a:solidFill>
+                <a:latin typeface="Bebas"/>
+                <a:ea typeface="Bebas"/>
+                <a:cs typeface="Bebas"/>
+                <a:sym typeface="Bebas"/>
+              </a:defRPr>
+            </a:pPr>
+            <a:endParaRPr lang="en-US" sz="1200" dirty="0">
+              <a:latin typeface="+mj-lt"/>
+            </a:endParaRPr>
+          </a:p>
+        </p:txBody>
+      </p:sp>
+      <p:sp>
+        <p:nvSpPr>
+          <p:cNvPr id="7" name="TextBox 6">
+            <a:extLst>
+              <a:ext uri="{FF2B5EF4-FFF2-40B4-BE49-F238E27FC236}">
+                <a16:creationId xmlns:a16="http://schemas.microsoft.com/office/drawing/2014/main" id="{EC14D69F-2D50-41C3-4BD5-C3B02F418B98}"/>
+              </a:ext>
+            </a:extLst>
+          </p:cNvPr>
+          <p:cNvSpPr txBox="1"/>
+          <p:nvPr/>
+        </p:nvSpPr>
+        <p:spPr>
+          <a:xfrm>
+            <a:off x="6957255" y="475588"/>
+            <a:ext cx="4942385" cy="4401205"/>
+          </a:xfrm>
+          <a:prstGeom prst="rect">
+            <a:avLst/>
+          </a:prstGeom>
+          <a:noFill/>
+        </p:spPr>
+        <p:txBody>
+          <a:bodyPr wrap="square" rtlCol="0">
+            <a:spAutoFit/>
+          </a:bodyPr>
+          <a:lstStyle/>
+          <a:p>
+            <a:pPr marL="342900" indent="-342900">
+              <a:buFont typeface="Arial" panose="020B0604020202020204" pitchFamily="34" charset="0"/>
+              <a:buChar char="•"/>
+            </a:pPr>
+            <a:r>
+              <a:rPr lang="en-US" sz="2000" dirty="0">
+                <a:solidFill>
+                  <a:schemeClr val="bg1"/>
+                </a:solidFill>
+              </a:rPr>
+              <a:t>Virus class has aggregation relationship with Capsid class and Acid Nucleic because all viruses must have this 2 element but when the virus attack host-cell, virus took away capsid and re-</a:t>
+            </a:r>
+            <a:r>
+              <a:rPr lang="en-US" sz="2000" dirty="0" err="1">
+                <a:solidFill>
+                  <a:schemeClr val="bg1"/>
+                </a:solidFill>
+              </a:rPr>
+              <a:t>contruct</a:t>
+            </a:r>
+            <a:r>
+              <a:rPr lang="en-US" sz="2000" dirty="0">
+                <a:solidFill>
+                  <a:schemeClr val="bg1"/>
+                </a:solidFill>
+              </a:rPr>
+              <a:t> the Acid, which means they are Has-a relation and independent.</a:t>
+            </a:r>
+          </a:p>
+          <a:p>
+            <a:endParaRPr lang="en-US" sz="2000" dirty="0">
+              <a:solidFill>
+                <a:schemeClr val="bg1"/>
+              </a:solidFill>
+            </a:endParaRPr>
+          </a:p>
+          <a:p>
+            <a:pPr marL="342900" indent="-342900">
+              <a:buFont typeface="Arial" panose="020B0604020202020204" pitchFamily="34" charset="0"/>
+              <a:buChar char="•"/>
+            </a:pPr>
+            <a:r>
+              <a:rPr lang="en-US" sz="2000" dirty="0" err="1">
+                <a:solidFill>
+                  <a:schemeClr val="bg1"/>
+                </a:solidFill>
+              </a:rPr>
+              <a:t>VirusEnvelope</a:t>
+            </a:r>
+            <a:r>
+              <a:rPr lang="en-US" sz="2000" dirty="0">
+                <a:solidFill>
+                  <a:schemeClr val="bg1"/>
+                </a:solidFill>
+              </a:rPr>
+              <a:t> has composition relationship with Envelope class because envelope is compulsory for us to discriminate between Enveloped virus and Non-enveloped virus. Enveloped virus can’t live without their “shell”.</a:t>
+            </a:r>
+          </a:p>
+        </p:txBody>
+      </p:sp>
+      <p:sp>
+        <p:nvSpPr>
+          <p:cNvPr id="4" name="TextBox 3">
+            <a:extLst>
+              <a:ext uri="{FF2B5EF4-FFF2-40B4-BE49-F238E27FC236}">
+                <a16:creationId xmlns:a16="http://schemas.microsoft.com/office/drawing/2014/main" id="{5BE27B91-2BFF-7C96-BAA2-12F767C9CF80}"/>
+              </a:ext>
+            </a:extLst>
+          </p:cNvPr>
+          <p:cNvSpPr txBox="1"/>
+          <p:nvPr/>
+        </p:nvSpPr>
+        <p:spPr>
+          <a:xfrm>
+            <a:off x="989045" y="461981"/>
+            <a:ext cx="5968210" cy="4401205"/>
+          </a:xfrm>
+          <a:prstGeom prst="rect">
+            <a:avLst/>
+          </a:prstGeom>
+          <a:noFill/>
+        </p:spPr>
+        <p:txBody>
+          <a:bodyPr wrap="square" rtlCol="0">
+            <a:spAutoFit/>
+          </a:bodyPr>
+          <a:lstStyle/>
+          <a:p>
+            <a:pPr marL="285750" indent="-285750">
+              <a:buFont typeface="Arial" panose="020B0604020202020204" pitchFamily="34" charset="0"/>
+              <a:buChar char="•"/>
+            </a:pPr>
+            <a:r>
+              <a:rPr lang="en-US" sz="2000" dirty="0">
+                <a:solidFill>
+                  <a:schemeClr val="bg1"/>
+                </a:solidFill>
+              </a:rPr>
+              <a:t>Inheritance: Enveloped Virus, Non-enveloped virus inherit Virus class; HIV, COVID-19, Herpes inherit Enveloped Virus; Rota, Astro, Adeno inherit Non-Enveloped Virus … </a:t>
+            </a:r>
+          </a:p>
+          <a:p>
+            <a:endParaRPr lang="en-US" sz="2000" dirty="0">
+              <a:solidFill>
+                <a:schemeClr val="bg1"/>
+              </a:solidFill>
+            </a:endParaRPr>
+          </a:p>
+          <a:p>
+            <a:pPr marL="285750" indent="-285750">
+              <a:buFont typeface="Arial" panose="020B0604020202020204" pitchFamily="34" charset="0"/>
+              <a:buChar char="•"/>
+            </a:pPr>
+            <a:r>
+              <a:rPr lang="en-US" sz="2000" dirty="0">
+                <a:solidFill>
+                  <a:schemeClr val="bg1"/>
+                </a:solidFill>
+              </a:rPr>
+              <a:t>Encapsulation: method getters, setters in each virus class: </a:t>
+            </a:r>
+            <a:r>
+              <a:rPr lang="en-US" sz="2000" dirty="0" err="1">
+                <a:solidFill>
+                  <a:schemeClr val="bg1"/>
+                </a:solidFill>
+              </a:rPr>
+              <a:t>getTegument</a:t>
+            </a:r>
+            <a:r>
+              <a:rPr lang="en-US" sz="2000" dirty="0">
+                <a:solidFill>
+                  <a:schemeClr val="bg1"/>
+                </a:solidFill>
+              </a:rPr>
+              <a:t>(); </a:t>
+            </a:r>
+            <a:r>
+              <a:rPr lang="en-US" sz="2000" dirty="0" err="1">
+                <a:solidFill>
+                  <a:schemeClr val="bg1"/>
+                </a:solidFill>
+              </a:rPr>
+              <a:t>getmProtein</a:t>
+            </a:r>
+            <a:r>
+              <a:rPr lang="en-US" sz="2000" dirty="0">
+                <a:solidFill>
+                  <a:schemeClr val="bg1"/>
+                </a:solidFill>
+              </a:rPr>
+              <a:t>(); </a:t>
+            </a:r>
+            <a:r>
+              <a:rPr lang="en-US" sz="2000" dirty="0" err="1">
+                <a:solidFill>
+                  <a:schemeClr val="bg1"/>
+                </a:solidFill>
+              </a:rPr>
+              <a:t>getFiber</a:t>
+            </a:r>
+            <a:r>
+              <a:rPr lang="en-US" sz="2000" dirty="0">
+                <a:solidFill>
+                  <a:schemeClr val="bg1"/>
+                </a:solidFill>
+              </a:rPr>
+              <a:t>();…</a:t>
+            </a:r>
+          </a:p>
+          <a:p>
+            <a:endParaRPr lang="en-US" sz="2000" dirty="0">
+              <a:solidFill>
+                <a:schemeClr val="bg1"/>
+              </a:solidFill>
+            </a:endParaRPr>
+          </a:p>
+          <a:p>
+            <a:pPr marL="285750" indent="-285750">
+              <a:buFont typeface="Arial" panose="020B0604020202020204" pitchFamily="34" charset="0"/>
+              <a:buChar char="•"/>
+            </a:pPr>
+            <a:r>
+              <a:rPr lang="en-US" sz="2000" dirty="0">
+                <a:solidFill>
+                  <a:schemeClr val="bg1"/>
+                </a:solidFill>
+              </a:rPr>
+              <a:t>Abstraction: abstracted class Element: describe biological components of a virus</a:t>
+            </a:r>
+          </a:p>
+          <a:p>
+            <a:endParaRPr lang="en-US" sz="2000" dirty="0">
+              <a:solidFill>
+                <a:schemeClr val="bg1"/>
+              </a:solidFill>
+            </a:endParaRPr>
+          </a:p>
+          <a:p>
+            <a:pPr marL="285750" indent="-285750">
+              <a:buFont typeface="Arial" panose="020B0604020202020204" pitchFamily="34" charset="0"/>
+              <a:buChar char="•"/>
+            </a:pPr>
+            <a:r>
+              <a:rPr lang="en-US" sz="2000" dirty="0">
+                <a:solidFill>
+                  <a:schemeClr val="bg1"/>
+                </a:solidFill>
+              </a:rPr>
+              <a:t>Polymorphism: </a:t>
+            </a:r>
+            <a:r>
+              <a:rPr lang="en-US" sz="2000" dirty="0" err="1">
+                <a:solidFill>
+                  <a:schemeClr val="bg1"/>
+                </a:solidFill>
+              </a:rPr>
+              <a:t>getDetail</a:t>
+            </a:r>
+            <a:r>
+              <a:rPr lang="en-US" sz="2000" dirty="0">
+                <a:solidFill>
+                  <a:schemeClr val="bg1"/>
+                </a:solidFill>
+              </a:rPr>
+              <a:t>() method; </a:t>
+            </a:r>
+            <a:r>
+              <a:rPr lang="en-US" sz="2000" dirty="0" err="1">
+                <a:solidFill>
+                  <a:schemeClr val="bg1"/>
+                </a:solidFill>
+              </a:rPr>
+              <a:t>Downcasting</a:t>
+            </a:r>
+            <a:r>
+              <a:rPr lang="en-US" sz="2000" dirty="0">
+                <a:solidFill>
+                  <a:schemeClr val="bg1"/>
+                </a:solidFill>
+              </a:rPr>
+              <a:t> from Virus class to </a:t>
+            </a:r>
+            <a:r>
+              <a:rPr lang="en-US" sz="2000" dirty="0" err="1">
+                <a:solidFill>
+                  <a:schemeClr val="bg1"/>
+                </a:solidFill>
+              </a:rPr>
+              <a:t>VirusWithEnvelope</a:t>
+            </a:r>
+            <a:r>
+              <a:rPr lang="en-US" sz="2000">
+                <a:solidFill>
+                  <a:schemeClr val="bg1"/>
+                </a:solidFill>
+              </a:rPr>
+              <a:t>, infect() method</a:t>
+            </a:r>
+            <a:endParaRPr lang="en-US" sz="2000" dirty="0">
+              <a:solidFill>
+                <a:schemeClr val="bg1"/>
+              </a:solidFill>
+            </a:endParaRPr>
+          </a:p>
+        </p:txBody>
+      </p:sp>
+    </p:spTree>
+    <p:extLst>
+      <p:ext uri="{BB962C8B-B14F-4D97-AF65-F5344CB8AC3E}">
+        <p14:creationId xmlns:p14="http://schemas.microsoft.com/office/powerpoint/2010/main" val="1389222877"/>
+      </p:ext>
+    </p:extLst>
+  </p:cSld>
+  <p:clrMapOvr>
+    <a:masterClrMapping/>
+  </p:clrMapOvr>
+</p:sld>
+</file>
+
+<file path=ppt/slides/slide13.xml><?xml version="1.0" encoding="utf-8"?>
+<p:sld xmlns:a="http://schemas.openxmlformats.org/drawingml/2006/main" xmlns:r="http://schemas.openxmlformats.org/officeDocument/2006/relationships" xmlns:p="http://schemas.openxmlformats.org/presentationml/2006/main">
+  <p:cSld>
     <p:bg>
       <p:bgPr>
         <a:solidFill>
@@ -13008,10 +13839,10 @@
       </p:sp>
       <p:pic>
         <p:nvPicPr>
-          <p:cNvPr id="4" name="Picture 3">
-            <a:extLst>
-              <a:ext uri="{FF2B5EF4-FFF2-40B4-BE49-F238E27FC236}">
-                <a16:creationId xmlns:a16="http://schemas.microsoft.com/office/drawing/2014/main" id="{799D571D-35A2-13F3-9FD4-90935B5E1D64}"/>
+          <p:cNvPr id="9" name="Picture 8" descr="Diagram&#10;&#10;Description automatically generated">
+            <a:extLst>
+              <a:ext uri="{FF2B5EF4-FFF2-40B4-BE49-F238E27FC236}">
+                <a16:creationId xmlns:a16="http://schemas.microsoft.com/office/drawing/2014/main" id="{6038C239-62E8-839E-854A-784BA2BAD97D}"/>
               </a:ext>
             </a:extLst>
           </p:cNvPr>
@@ -13028,8 +13859,8 @@
         </p:blipFill>
         <p:spPr>
           <a:xfrm>
-            <a:off x="1" y="-9847"/>
-            <a:ext cx="7249885" cy="6930763"/>
+            <a:off x="0" y="0"/>
+            <a:ext cx="6947065" cy="6858000"/>
           </a:xfrm>
           <a:prstGeom prst="rect">
             <a:avLst/>
@@ -13281,44 +14112,21 @@
           </a:p>
         </p:txBody>
       </p:sp>
-      <p:sp>
-        <p:nvSpPr>
-          <p:cNvPr id="7" name="Content Placeholder 6">
-            <a:extLst>
-              <a:ext uri="{FF2B5EF4-FFF2-40B4-BE49-F238E27FC236}">
-                <a16:creationId xmlns:a16="http://schemas.microsoft.com/office/drawing/2014/main" id="{F152135B-AC4E-DC7A-EFB7-AD4C20C9C687}"/>
-              </a:ext>
-            </a:extLst>
-          </p:cNvPr>
-          <p:cNvSpPr>
-            <a:spLocks noGrp="1"/>
-          </p:cNvSpPr>
+      <p:pic>
+        <p:nvPicPr>
+          <p:cNvPr id="4" name="Content Placeholder 3" descr="Diagram&#10;&#10;Description automatically generated">
+            <a:extLst>
+              <a:ext uri="{FF2B5EF4-FFF2-40B4-BE49-F238E27FC236}">
+                <a16:creationId xmlns:a16="http://schemas.microsoft.com/office/drawing/2014/main" id="{7366D7D2-9CA0-8869-42CB-8380C6769549}"/>
+              </a:ext>
+            </a:extLst>
+          </p:cNvPr>
+          <p:cNvPicPr>
+            <a:picLocks noGrp="1" noChangeAspect="1"/>
+          </p:cNvPicPr>
           <p:nvPr>
             <p:ph sz="quarter" idx="16"/>
           </p:nvPr>
-        </p:nvSpPr>
-        <p:spPr/>
-        <p:txBody>
-          <a:bodyPr/>
-          <a:lstStyle/>
-          <a:p>
-            <a:endParaRPr lang="en-US"/>
-          </a:p>
-        </p:txBody>
-      </p:sp>
-      <p:pic>
-        <p:nvPicPr>
-          <p:cNvPr id="3" name="Picture 2">
-            <a:extLst>
-              <a:ext uri="{FF2B5EF4-FFF2-40B4-BE49-F238E27FC236}">
-                <a16:creationId xmlns:a16="http://schemas.microsoft.com/office/drawing/2014/main" id="{1987CE55-B5C5-8E8B-B4F3-C76A36272E80}"/>
-              </a:ext>
-            </a:extLst>
-          </p:cNvPr>
-          <p:cNvPicPr>
-            <a:picLocks noChangeAspect="1"/>
-          </p:cNvPicPr>
-          <p:nvPr/>
         </p:nvPicPr>
         <p:blipFill>
           <a:blip r:embed="rId2"/>
@@ -13328,12 +14136,9 @@
         </p:blipFill>
         <p:spPr>
           <a:xfrm>
-            <a:off x="4825191" y="-37151"/>
-            <a:ext cx="7366809" cy="6895151"/>
+            <a:off x="5271374" y="1378794"/>
+            <a:ext cx="6606948" cy="4100412"/>
           </a:xfrm>
-          <a:prstGeom prst="rect">
-            <a:avLst/>
-          </a:prstGeom>
         </p:spPr>
       </p:pic>
     </p:spTree>
@@ -13459,10 +14264,10 @@
       </p:sp>
       <p:pic>
         <p:nvPicPr>
-          <p:cNvPr id="5" name="Picture 4">
-            <a:extLst>
-              <a:ext uri="{FF2B5EF4-FFF2-40B4-BE49-F238E27FC236}">
-                <a16:creationId xmlns:a16="http://schemas.microsoft.com/office/drawing/2014/main" id="{F178E304-F949-64F5-8507-1F18BA27FAB4}"/>
+          <p:cNvPr id="8" name="Picture 7" descr="Diagram&#10;&#10;Description automatically generated">
+            <a:extLst>
+              <a:ext uri="{FF2B5EF4-FFF2-40B4-BE49-F238E27FC236}">
+                <a16:creationId xmlns:a16="http://schemas.microsoft.com/office/drawing/2014/main" id="{E32C298A-6F3E-26B9-0E9C-49FA8B976399}"/>
               </a:ext>
             </a:extLst>
           </p:cNvPr>
@@ -13479,8 +14284,8 @@
         </p:blipFill>
         <p:spPr>
           <a:xfrm>
-            <a:off x="-1" y="847288"/>
-            <a:ext cx="12192000" cy="6010263"/>
+            <a:off x="-1" y="1187693"/>
+            <a:ext cx="12192000" cy="5669858"/>
           </a:xfrm>
           <a:prstGeom prst="rect">
             <a:avLst/>
@@ -13597,23 +14402,23 @@
         </p:spPr>
         <p:txBody>
           <a:bodyPr>
-            <a:normAutofit fontScale="90000"/>
+            <a:normAutofit/>
           </a:bodyPr>
           <a:lstStyle/>
           <a:p>
             <a:r>
               <a:rPr lang="en-US" dirty="0"/>
-              <a:t>Enveloped Virus/ Non-enveloped virus/ Element</a:t>
+              <a:t>VIRUS CLASS</a:t>
             </a:r>
           </a:p>
         </p:txBody>
       </p:sp>
       <p:pic>
         <p:nvPicPr>
-          <p:cNvPr id="19" name="Picture 18" descr="Text&#10;&#10;Description automatically generated">
-            <a:extLst>
-              <a:ext uri="{FF2B5EF4-FFF2-40B4-BE49-F238E27FC236}">
-                <a16:creationId xmlns:a16="http://schemas.microsoft.com/office/drawing/2014/main" id="{BE6A1CF2-94D2-4CE9-1A96-9A583C50E796}"/>
+          <p:cNvPr id="3" name="Picture 2">
+            <a:extLst>
+              <a:ext uri="{FF2B5EF4-FFF2-40B4-BE49-F238E27FC236}">
+                <a16:creationId xmlns:a16="http://schemas.microsoft.com/office/drawing/2014/main" id="{B0C6DF80-9B91-CCA4-957F-1C7437EAF853}"/>
               </a:ext>
             </a:extLst>
           </p:cNvPr>
@@ -13630,98 +14435,8 @@
         </p:blipFill>
         <p:spPr>
           <a:xfrm>
-            <a:off x="0" y="823954"/>
-            <a:ext cx="4254759" cy="5634139"/>
-          </a:xfrm>
-          <a:prstGeom prst="rect">
-            <a:avLst/>
-          </a:prstGeom>
-        </p:spPr>
-      </p:pic>
-      <p:pic>
-        <p:nvPicPr>
-          <p:cNvPr id="9" name="Picture 8" descr="Diagram&#10;&#10;Description automatically generated">
-            <a:extLst>
-              <a:ext uri="{FF2B5EF4-FFF2-40B4-BE49-F238E27FC236}">
-                <a16:creationId xmlns:a16="http://schemas.microsoft.com/office/drawing/2014/main" id="{34D7569F-DC07-1C0C-7E77-075DAE24B96F}"/>
-              </a:ext>
-            </a:extLst>
-          </p:cNvPr>
-          <p:cNvPicPr>
-            <a:picLocks noChangeAspect="1"/>
-          </p:cNvPicPr>
-          <p:nvPr/>
-        </p:nvPicPr>
-        <p:blipFill>
-          <a:blip r:embed="rId3"/>
-          <a:stretch>
-            <a:fillRect/>
-          </a:stretch>
-        </p:blipFill>
-        <p:spPr>
-          <a:xfrm>
-            <a:off x="4403685" y="890236"/>
-            <a:ext cx="7788315" cy="5281118"/>
-          </a:xfrm>
-          <a:prstGeom prst="rect">
-            <a:avLst/>
-          </a:prstGeom>
-        </p:spPr>
-      </p:pic>
-      <p:pic>
-        <p:nvPicPr>
-          <p:cNvPr id="6" name="Picture 5">
-            <a:extLst>
-              <a:ext uri="{FF2B5EF4-FFF2-40B4-BE49-F238E27FC236}">
-                <a16:creationId xmlns:a16="http://schemas.microsoft.com/office/drawing/2014/main" id="{AF75B329-BB7B-E763-E75E-A95C657401FF}"/>
-              </a:ext>
-            </a:extLst>
-          </p:cNvPr>
-          <p:cNvPicPr>
-            <a:picLocks noChangeAspect="1"/>
-          </p:cNvPicPr>
-          <p:nvPr/>
-        </p:nvPicPr>
-        <p:blipFill>
-          <a:blip r:embed="rId4"/>
-          <a:stretch>
-            <a:fillRect/>
-          </a:stretch>
-        </p:blipFill>
-        <p:spPr>
-          <a:xfrm>
-            <a:off x="4340164" y="823954"/>
-            <a:ext cx="7851836" cy="5644518"/>
-          </a:xfrm>
-          <a:prstGeom prst="rect">
-            <a:avLst/>
-          </a:prstGeom>
-        </p:spPr>
-      </p:pic>
-      <p:pic>
-        <p:nvPicPr>
-          <p:cNvPr id="23" name="Picture 22" descr="Diagram&#10;&#10;Description automatically generated">
-            <a:extLst>
-              <a:ext uri="{FF2B5EF4-FFF2-40B4-BE49-F238E27FC236}">
-                <a16:creationId xmlns:a16="http://schemas.microsoft.com/office/drawing/2014/main" id="{9641D32A-A693-4B33-9F78-9572C819D9B3}"/>
-              </a:ext>
-            </a:extLst>
-          </p:cNvPr>
-          <p:cNvPicPr>
-            <a:picLocks noChangeAspect="1"/>
-          </p:cNvPicPr>
-          <p:nvPr/>
-        </p:nvPicPr>
-        <p:blipFill>
-          <a:blip r:embed="rId5"/>
-          <a:stretch>
-            <a:fillRect/>
-          </a:stretch>
-        </p:blipFill>
-        <p:spPr>
-          <a:xfrm>
-            <a:off x="4340165" y="823953"/>
-            <a:ext cx="7851836" cy="5654729"/>
+            <a:off x="2488348" y="1011373"/>
+            <a:ext cx="7497221" cy="5525271"/>
           </a:xfrm>
           <a:prstGeom prst="rect">
             <a:avLst/>
@@ -13738,142 +14453,6 @@
   <p:clrMapOvr>
     <a:masterClrMapping/>
   </p:clrMapOvr>
-  <p:timing>
-    <p:tnLst>
-      <p:par>
-        <p:cTn id="1" dur="indefinite" restart="never" nodeType="tmRoot">
-          <p:childTnLst>
-            <p:seq concurrent="1" nextAc="seek">
-              <p:cTn id="2" dur="indefinite" nodeType="mainSeq">
-                <p:childTnLst>
-                  <p:par>
-                    <p:cTn id="3" fill="hold">
-                      <p:stCondLst>
-                        <p:cond delay="indefinite"/>
-                      </p:stCondLst>
-                      <p:childTnLst>
-                        <p:par>
-                          <p:cTn id="4" fill="hold">
-                            <p:stCondLst>
-                              <p:cond delay="0"/>
-                            </p:stCondLst>
-                            <p:childTnLst>
-                              <p:par>
-                                <p:cTn id="5" presetID="21" presetClass="entr" presetSubtype="1" fill="hold" nodeType="clickEffect">
-                                  <p:stCondLst>
-                                    <p:cond delay="0"/>
-                                  </p:stCondLst>
-                                  <p:childTnLst>
-                                    <p:set>
-                                      <p:cBhvr>
-                                        <p:cTn id="6" dur="1" fill="hold">
-                                          <p:stCondLst>
-                                            <p:cond delay="0"/>
-                                          </p:stCondLst>
-                                        </p:cTn>
-                                        <p:tgtEl>
-                                          <p:spTgt spid="6"/>
-                                        </p:tgtEl>
-                                        <p:attrNameLst>
-                                          <p:attrName>style.visibility</p:attrName>
-                                        </p:attrNameLst>
-                                      </p:cBhvr>
-                                      <p:to>
-                                        <p:strVal val="visible"/>
-                                      </p:to>
-                                    </p:set>
-                                    <p:animEffect transition="in" filter="wheel(1)">
-                                      <p:cBhvr>
-                                        <p:cTn id="7" dur="2000"/>
-                                        <p:tgtEl>
-                                          <p:spTgt spid="6"/>
-                                        </p:tgtEl>
-                                      </p:cBhvr>
-                                    </p:animEffect>
-                                  </p:childTnLst>
-                                </p:cTn>
-                              </p:par>
-                            </p:childTnLst>
-                          </p:cTn>
-                        </p:par>
-                      </p:childTnLst>
-                    </p:cTn>
-                  </p:par>
-                  <p:par>
-                    <p:cTn id="8" fill="hold">
-                      <p:stCondLst>
-                        <p:cond delay="indefinite"/>
-                      </p:stCondLst>
-                      <p:childTnLst>
-                        <p:par>
-                          <p:cTn id="9" fill="hold">
-                            <p:stCondLst>
-                              <p:cond delay="0"/>
-                            </p:stCondLst>
-                            <p:childTnLst>
-                              <p:par>
-                                <p:cTn id="10" presetID="21" presetClass="entr" presetSubtype="1" fill="hold" nodeType="clickEffect">
-                                  <p:stCondLst>
-                                    <p:cond delay="0"/>
-                                  </p:stCondLst>
-                                  <p:childTnLst>
-                                    <p:set>
-                                      <p:cBhvr>
-                                        <p:cTn id="11" dur="1" fill="hold">
-                                          <p:stCondLst>
-                                            <p:cond delay="0"/>
-                                          </p:stCondLst>
-                                        </p:cTn>
-                                        <p:tgtEl>
-                                          <p:spTgt spid="23"/>
-                                        </p:tgtEl>
-                                        <p:attrNameLst>
-                                          <p:attrName>style.visibility</p:attrName>
-                                        </p:attrNameLst>
-                                      </p:cBhvr>
-                                      <p:to>
-                                        <p:strVal val="visible"/>
-                                      </p:to>
-                                    </p:set>
-                                    <p:animEffect transition="in" filter="wheel(1)">
-                                      <p:cBhvr>
-                                        <p:cTn id="12" dur="2000"/>
-                                        <p:tgtEl>
-                                          <p:spTgt spid="23"/>
-                                        </p:tgtEl>
-                                      </p:cBhvr>
-                                    </p:animEffect>
-                                  </p:childTnLst>
-                                </p:cTn>
-                              </p:par>
-                            </p:childTnLst>
-                          </p:cTn>
-                        </p:par>
-                      </p:childTnLst>
-                    </p:cTn>
-                  </p:par>
-                </p:childTnLst>
-              </p:cTn>
-              <p:prevCondLst>
-                <p:cond evt="onPrev" delay="0">
-                  <p:tgtEl>
-                    <p:sldTgt/>
-                  </p:tgtEl>
-                </p:cond>
-              </p:prevCondLst>
-              <p:nextCondLst>
-                <p:cond evt="onNext" delay="0">
-                  <p:tgtEl>
-                    <p:sldTgt/>
-                  </p:tgtEl>
-                </p:cond>
-              </p:nextCondLst>
-            </p:seq>
-          </p:childTnLst>
-        </p:cTn>
-      </p:par>
-    </p:tnLst>
-  </p:timing>
 </p:sld>
 </file>
 
@@ -13896,87 +14475,23 @@
       </p:grpSpPr>
       <p:sp>
         <p:nvSpPr>
-          <p:cNvPr id="8" name="Title 7" hidden="1">
-            <a:extLst>
-              <a:ext uri="{FF2B5EF4-FFF2-40B4-BE49-F238E27FC236}">
-                <a16:creationId xmlns:a16="http://schemas.microsoft.com/office/drawing/2014/main" id="{097D2725-75F4-45AA-950F-2F67BBF8F754}"/>
-              </a:ext>
-            </a:extLst>
-          </p:cNvPr>
-          <p:cNvSpPr>
-            <a:spLocks noGrp="1"/>
-          </p:cNvSpPr>
-          <p:nvPr>
-            <p:ph type="title"/>
-          </p:nvPr>
+          <p:cNvPr id="12" name="Rectangle 11">
+            <a:extLst>
+              <a:ext uri="{FF2B5EF4-FFF2-40B4-BE49-F238E27FC236}">
+                <a16:creationId xmlns:a16="http://schemas.microsoft.com/office/drawing/2014/main" id="{209544CB-5CBD-F3F5-A576-674C2C46E735}"/>
+              </a:ext>
+              <a:ext uri="{C183D7F6-B498-43B3-948B-1728B52AA6E4}">
+                <adec:decorative xmlns:adec="http://schemas.microsoft.com/office/drawing/2017/decorative" val="1"/>
+              </a:ext>
+            </a:extLst>
+          </p:cNvPr>
+          <p:cNvSpPr/>
+          <p:nvPr/>
         </p:nvSpPr>
         <p:spPr>
           <a:xfrm>
-            <a:off x="595884" y="0"/>
-            <a:ext cx="11000232" cy="1188720"/>
-          </a:xfrm>
-        </p:spPr>
-        <p:txBody>
-          <a:bodyPr/>
-          <a:lstStyle/>
-          <a:p>
-            <a:r>
-              <a:rPr lang="en-US" dirty="0"/>
-              <a:t>Title:</a:t>
-            </a:r>
-          </a:p>
-        </p:txBody>
-      </p:sp>
-      <p:pic>
-        <p:nvPicPr>
-          <p:cNvPr id="5" name="Picture Placeholder 4" descr="Abstract Building" title="Abstract Building">
-            <a:extLst>
-              <a:ext uri="{FF2B5EF4-FFF2-40B4-BE49-F238E27FC236}">
-                <a16:creationId xmlns:a16="http://schemas.microsoft.com/office/drawing/2014/main" id="{A0DC386B-E165-424D-B694-E2C45FFA4071}"/>
-              </a:ext>
-            </a:extLst>
-          </p:cNvPr>
-          <p:cNvPicPr>
-            <a:picLocks noGrp="1" noChangeAspect="1"/>
-          </p:cNvPicPr>
-          <p:nvPr>
-            <p:ph type="pic" sz="quarter" idx="10"/>
-          </p:nvPr>
-        </p:nvPicPr>
-        <p:blipFill>
-          <a:blip r:embed="rId3">
-            <a:extLst>
-              <a:ext uri="{28A0092B-C50C-407E-A947-70E740481C1C}">
-                <a14:useLocalDpi xmlns:a14="http://schemas.microsoft.com/office/drawing/2010/main" val="0"/>
-              </a:ext>
-            </a:extLst>
-          </a:blip>
-          <a:srcRect/>
-          <a:stretch>
-            <a:fillRect/>
-          </a:stretch>
-        </p:blipFill>
-        <p:spPr/>
-      </p:pic>
-      <p:sp>
-        <p:nvSpPr>
-          <p:cNvPr id="14" name="Rectangle 13">
-            <a:extLst>
-              <a:ext uri="{FF2B5EF4-FFF2-40B4-BE49-F238E27FC236}">
-                <a16:creationId xmlns:a16="http://schemas.microsoft.com/office/drawing/2014/main" id="{3C1F0EB8-D260-4FB6-ACF6-6E86B9A02919}"/>
-              </a:ext>
-              <a:ext uri="{C183D7F6-B498-43B3-948B-1728B52AA6E4}">
-                <adec:decorative xmlns:adec="http://schemas.microsoft.com/office/drawing/2017/decorative" val="1"/>
-              </a:ext>
-            </a:extLst>
-          </p:cNvPr>
-          <p:cNvSpPr/>
-          <p:nvPr/>
-        </p:nvSpPr>
-        <p:spPr>
-          <a:xfrm>
-            <a:off x="864679" y="242207"/>
-            <a:ext cx="11181141" cy="6066255"/>
+            <a:off x="1" y="1"/>
+            <a:ext cx="12192000" cy="6858000"/>
           </a:xfrm>
           <a:prstGeom prst="rect">
             <a:avLst/>
@@ -14016,360 +14531,73 @@
       </p:sp>
       <p:sp>
         <p:nvSpPr>
-          <p:cNvPr id="15" name="Rectangle 14">
-            <a:extLst>
-              <a:ext uri="{FF2B5EF4-FFF2-40B4-BE49-F238E27FC236}">
-                <a16:creationId xmlns:a16="http://schemas.microsoft.com/office/drawing/2014/main" id="{76D4BFC2-69CA-4ED6-89E7-A9ADB571E7A4}"/>
-              </a:ext>
-            </a:extLst>
-          </p:cNvPr>
-          <p:cNvSpPr/>
-          <p:nvPr/>
+          <p:cNvPr id="7" name="Title 6">
+            <a:extLst>
+              <a:ext uri="{FF2B5EF4-FFF2-40B4-BE49-F238E27FC236}">
+                <a16:creationId xmlns:a16="http://schemas.microsoft.com/office/drawing/2014/main" id="{4D671F4D-9614-41E9-BA0C-7977DEBBBBB3}"/>
+              </a:ext>
+            </a:extLst>
+          </p:cNvPr>
+          <p:cNvSpPr>
+            <a:spLocks noGrp="1"/>
+          </p:cNvSpPr>
+          <p:nvPr>
+            <p:ph type="title"/>
+          </p:nvPr>
         </p:nvSpPr>
         <p:spPr>
           <a:xfrm>
-            <a:off x="1302369" y="4065464"/>
-            <a:ext cx="4423315" cy="1738307"/>
+            <a:off x="-168894" y="24572"/>
+            <a:ext cx="12360894" cy="851728"/>
+          </a:xfrm>
+        </p:spPr>
+        <p:txBody>
+          <a:bodyPr>
+            <a:normAutofit/>
+          </a:bodyPr>
+          <a:lstStyle/>
+          <a:p>
+            <a:r>
+              <a:rPr lang="en-US" dirty="0"/>
+              <a:t>ELEMENT PACKAGE</a:t>
+            </a:r>
+          </a:p>
+        </p:txBody>
+      </p:sp>
+      <p:pic>
+        <p:nvPicPr>
+          <p:cNvPr id="4" name="Picture 3" descr="Diagram&#10;&#10;Description automatically generated">
+            <a:extLst>
+              <a:ext uri="{FF2B5EF4-FFF2-40B4-BE49-F238E27FC236}">
+                <a16:creationId xmlns:a16="http://schemas.microsoft.com/office/drawing/2014/main" id="{CC3807B9-1318-F1F0-3ADE-B4F99BDC3647}"/>
+              </a:ext>
+            </a:extLst>
+          </p:cNvPr>
+          <p:cNvPicPr>
+            <a:picLocks noChangeAspect="1"/>
+          </p:cNvPicPr>
+          <p:nvPr/>
+        </p:nvPicPr>
+        <p:blipFill>
+          <a:blip r:embed="rId2"/>
+          <a:stretch>
+            <a:fillRect/>
+          </a:stretch>
+        </p:blipFill>
+        <p:spPr>
+          <a:xfrm>
+            <a:off x="1076952" y="900871"/>
+            <a:ext cx="10038095" cy="5638095"/>
           </a:xfrm>
           <a:prstGeom prst="rect">
             <a:avLst/>
           </a:prstGeom>
-          <a:noFill/>
-          <a:ln>
-            <a:noFill/>
-          </a:ln>
         </p:spPr>
-        <p:style>
-          <a:lnRef idx="2">
-            <a:schemeClr val="accent1">
-              <a:shade val="50000"/>
-            </a:schemeClr>
-          </a:lnRef>
-          <a:fillRef idx="1">
-            <a:schemeClr val="accent1"/>
-          </a:fillRef>
-          <a:effectRef idx="0">
-            <a:schemeClr val="accent1"/>
-          </a:effectRef>
-          <a:fontRef idx="minor">
-            <a:schemeClr val="lt1"/>
-          </a:fontRef>
-        </p:style>
-        <p:txBody>
-          <a:bodyPr lIns="274320" rIns="91440" rtlCol="0" anchor="ctr"/>
-          <a:lstStyle/>
-          <a:p>
-            <a:pPr>
-              <a:lnSpc>
-                <a:spcPct val="80000"/>
-              </a:lnSpc>
-              <a:defRPr sz="10000">
-                <a:solidFill>
-                  <a:srgbClr val="3A3B39"/>
-                </a:solidFill>
-                <a:latin typeface="Bebas"/>
-                <a:ea typeface="Bebas"/>
-                <a:cs typeface="Bebas"/>
-                <a:sym typeface="Bebas"/>
-              </a:defRPr>
-            </a:pPr>
-            <a:endParaRPr lang="en-US" sz="1200" dirty="0">
-              <a:latin typeface="+mj-lt"/>
-            </a:endParaRPr>
-          </a:p>
-        </p:txBody>
-      </p:sp>
-      <p:sp>
-        <p:nvSpPr>
-          <p:cNvPr id="7" name="TextBox 6">
-            <a:extLst>
-              <a:ext uri="{FF2B5EF4-FFF2-40B4-BE49-F238E27FC236}">
-                <a16:creationId xmlns:a16="http://schemas.microsoft.com/office/drawing/2014/main" id="{EC14D69F-2D50-41C3-4BD5-C3B02F418B98}"/>
-              </a:ext>
-            </a:extLst>
-          </p:cNvPr>
-          <p:cNvSpPr txBox="1"/>
-          <p:nvPr/>
-        </p:nvSpPr>
-        <p:spPr>
-          <a:xfrm>
-            <a:off x="6957255" y="475588"/>
-            <a:ext cx="4942385" cy="4401205"/>
-          </a:xfrm>
-          <a:prstGeom prst="rect">
-            <a:avLst/>
-          </a:prstGeom>
-          <a:noFill/>
-        </p:spPr>
-        <p:txBody>
-          <a:bodyPr wrap="square" rtlCol="0">
-            <a:spAutoFit/>
-          </a:bodyPr>
-          <a:lstStyle/>
-          <a:p>
-            <a:pPr marL="342900" indent="-342900">
-              <a:buFont typeface="Arial" panose="020B0604020202020204" pitchFamily="34" charset="0"/>
-              <a:buChar char="•"/>
-            </a:pPr>
-            <a:r>
-              <a:rPr lang="en-US" sz="2000" dirty="0">
-                <a:solidFill>
-                  <a:schemeClr val="bg1"/>
-                </a:solidFill>
-              </a:rPr>
-              <a:t>Virus class has aggregation relationship with Capsid class and Acid Nucleic because all viruses must have this 2 element but when the virus attack host-cell, virus took away capsid and re-</a:t>
-            </a:r>
-            <a:r>
-              <a:rPr lang="en-US" sz="2000" dirty="0" err="1">
-                <a:solidFill>
-                  <a:schemeClr val="bg1"/>
-                </a:solidFill>
-              </a:rPr>
-              <a:t>contruct</a:t>
-            </a:r>
-            <a:r>
-              <a:rPr lang="en-US" sz="2000" dirty="0">
-                <a:solidFill>
-                  <a:schemeClr val="bg1"/>
-                </a:solidFill>
-              </a:rPr>
-              <a:t> the Acid, which means they are Has-a relation and independent.</a:t>
-            </a:r>
-          </a:p>
-          <a:p>
-            <a:endParaRPr lang="en-US" sz="2000" dirty="0">
-              <a:solidFill>
-                <a:schemeClr val="bg1"/>
-              </a:solidFill>
-            </a:endParaRPr>
-          </a:p>
-          <a:p>
-            <a:pPr marL="342900" indent="-342900">
-              <a:buFont typeface="Arial" panose="020B0604020202020204" pitchFamily="34" charset="0"/>
-              <a:buChar char="•"/>
-            </a:pPr>
-            <a:r>
-              <a:rPr lang="en-US" sz="2000" dirty="0" err="1">
-                <a:solidFill>
-                  <a:schemeClr val="bg1"/>
-                </a:solidFill>
-              </a:rPr>
-              <a:t>VirusEnvelope</a:t>
-            </a:r>
-            <a:r>
-              <a:rPr lang="en-US" sz="2000" dirty="0">
-                <a:solidFill>
-                  <a:schemeClr val="bg1"/>
-                </a:solidFill>
-              </a:rPr>
-              <a:t> has composition relationship with Envelope class because envelope is compulsory for us to discriminate between Enveloped virus and Non-enveloped virus. Enveloped virus can’t live without their “shell”.</a:t>
-            </a:r>
-          </a:p>
-        </p:txBody>
-      </p:sp>
-      <p:sp>
-        <p:nvSpPr>
-          <p:cNvPr id="4" name="TextBox 3">
-            <a:extLst>
-              <a:ext uri="{FF2B5EF4-FFF2-40B4-BE49-F238E27FC236}">
-                <a16:creationId xmlns:a16="http://schemas.microsoft.com/office/drawing/2014/main" id="{5BE27B91-2BFF-7C96-BAA2-12F767C9CF80}"/>
-              </a:ext>
-            </a:extLst>
-          </p:cNvPr>
-          <p:cNvSpPr txBox="1"/>
-          <p:nvPr/>
-        </p:nvSpPr>
-        <p:spPr>
-          <a:xfrm>
-            <a:off x="989045" y="461981"/>
-            <a:ext cx="5968210" cy="4093428"/>
-          </a:xfrm>
-          <a:prstGeom prst="rect">
-            <a:avLst/>
-          </a:prstGeom>
-          <a:noFill/>
-        </p:spPr>
-        <p:txBody>
-          <a:bodyPr wrap="square" rtlCol="0">
-            <a:spAutoFit/>
-          </a:bodyPr>
-          <a:lstStyle/>
-          <a:p>
-            <a:pPr marL="285750" indent="-285750">
-              <a:buFont typeface="Arial" panose="020B0604020202020204" pitchFamily="34" charset="0"/>
-              <a:buChar char="•"/>
-            </a:pPr>
-            <a:r>
-              <a:rPr lang="en-US" sz="2000" dirty="0">
-                <a:solidFill>
-                  <a:schemeClr val="bg1"/>
-                </a:solidFill>
-              </a:rPr>
-              <a:t>Inheritance: Enveloped Virus, Non-enveloped virus inherit Virus class; HIV, COVID-19, Herpes inherit Enveloped Virus; Rota, Astro, Adeno inherit Non-Enveloped Virus … </a:t>
-            </a:r>
-          </a:p>
-          <a:p>
-            <a:endParaRPr lang="en-US" sz="2000" dirty="0">
-              <a:solidFill>
-                <a:schemeClr val="bg1"/>
-              </a:solidFill>
-            </a:endParaRPr>
-          </a:p>
-          <a:p>
-            <a:pPr marL="285750" indent="-285750">
-              <a:buFont typeface="Arial" panose="020B0604020202020204" pitchFamily="34" charset="0"/>
-              <a:buChar char="•"/>
-            </a:pPr>
-            <a:r>
-              <a:rPr lang="en-US" sz="2000" dirty="0">
-                <a:solidFill>
-                  <a:schemeClr val="bg1"/>
-                </a:solidFill>
-              </a:rPr>
-              <a:t>Encapsulation: method getters, setters in each virus class: </a:t>
-            </a:r>
-            <a:r>
-              <a:rPr lang="en-US" sz="2000" dirty="0" err="1">
-                <a:solidFill>
-                  <a:schemeClr val="bg1"/>
-                </a:solidFill>
-              </a:rPr>
-              <a:t>getTegument</a:t>
-            </a:r>
-            <a:r>
-              <a:rPr lang="en-US" sz="2000" dirty="0">
-                <a:solidFill>
-                  <a:schemeClr val="bg1"/>
-                </a:solidFill>
-              </a:rPr>
-              <a:t>(); </a:t>
-            </a:r>
-            <a:r>
-              <a:rPr lang="en-US" sz="2000" dirty="0" err="1">
-                <a:solidFill>
-                  <a:schemeClr val="bg1"/>
-                </a:solidFill>
-              </a:rPr>
-              <a:t>getmProtein</a:t>
-            </a:r>
-            <a:r>
-              <a:rPr lang="en-US" sz="2000" dirty="0">
-                <a:solidFill>
-                  <a:schemeClr val="bg1"/>
-                </a:solidFill>
-              </a:rPr>
-              <a:t>(); </a:t>
-            </a:r>
-            <a:r>
-              <a:rPr lang="en-US" sz="2000" dirty="0" err="1">
-                <a:solidFill>
-                  <a:schemeClr val="bg1"/>
-                </a:solidFill>
-              </a:rPr>
-              <a:t>getFiber</a:t>
-            </a:r>
-            <a:r>
-              <a:rPr lang="en-US" sz="2000" dirty="0">
-                <a:solidFill>
-                  <a:schemeClr val="bg1"/>
-                </a:solidFill>
-              </a:rPr>
-              <a:t>();…</a:t>
-            </a:r>
-          </a:p>
-          <a:p>
-            <a:endParaRPr lang="en-US" sz="2000" dirty="0">
-              <a:solidFill>
-                <a:schemeClr val="bg1"/>
-              </a:solidFill>
-            </a:endParaRPr>
-          </a:p>
-          <a:p>
-            <a:pPr marL="285750" indent="-285750">
-              <a:buFont typeface="Arial" panose="020B0604020202020204" pitchFamily="34" charset="0"/>
-              <a:buChar char="•"/>
-            </a:pPr>
-            <a:r>
-              <a:rPr lang="en-US" sz="2000" dirty="0">
-                <a:solidFill>
-                  <a:schemeClr val="bg1"/>
-                </a:solidFill>
-              </a:rPr>
-              <a:t>Abstraction: abstracted class Element: describe biological components of a virus</a:t>
-            </a:r>
-          </a:p>
-          <a:p>
-            <a:endParaRPr lang="en-US" sz="2000" dirty="0">
-              <a:solidFill>
-                <a:schemeClr val="bg1"/>
-              </a:solidFill>
-            </a:endParaRPr>
-          </a:p>
-          <a:p>
-            <a:pPr marL="285750" indent="-285750">
-              <a:buFont typeface="Arial" panose="020B0604020202020204" pitchFamily="34" charset="0"/>
-              <a:buChar char="•"/>
-            </a:pPr>
-            <a:r>
-              <a:rPr lang="en-US" sz="2000" dirty="0">
-                <a:solidFill>
-                  <a:schemeClr val="bg1"/>
-                </a:solidFill>
-              </a:rPr>
-              <a:t>Polymorphism: </a:t>
-            </a:r>
-            <a:r>
-              <a:rPr lang="en-US" sz="2000" dirty="0" err="1">
-                <a:solidFill>
-                  <a:schemeClr val="bg1"/>
-                </a:solidFill>
-              </a:rPr>
-              <a:t>getDetail</a:t>
-            </a:r>
-            <a:r>
-              <a:rPr lang="en-US" sz="2000" dirty="0">
-                <a:solidFill>
-                  <a:schemeClr val="bg1"/>
-                </a:solidFill>
-              </a:rPr>
-              <a:t>() method; </a:t>
-            </a:r>
-            <a:r>
-              <a:rPr lang="en-US" sz="2000" dirty="0" err="1">
-                <a:solidFill>
-                  <a:schemeClr val="bg1"/>
-                </a:solidFill>
-              </a:rPr>
-              <a:t>Downcasting</a:t>
-            </a:r>
-            <a:r>
-              <a:rPr lang="en-US" sz="2000" dirty="0">
-                <a:solidFill>
-                  <a:schemeClr val="bg1"/>
-                </a:solidFill>
-              </a:rPr>
-              <a:t> from Virus class to </a:t>
-            </a:r>
-            <a:r>
-              <a:rPr lang="en-US" sz="2000" dirty="0" err="1">
-                <a:solidFill>
-                  <a:schemeClr val="bg1"/>
-                </a:solidFill>
-              </a:rPr>
-              <a:t>VirusWithEnvelope</a:t>
-            </a:r>
-            <a:endParaRPr lang="en-US" sz="2000" dirty="0">
-              <a:solidFill>
-                <a:schemeClr val="bg1"/>
-              </a:solidFill>
-            </a:endParaRPr>
-          </a:p>
-        </p:txBody>
-      </p:sp>
+      </p:pic>
     </p:spTree>
     <p:extLst>
       <p:ext uri="{BB962C8B-B14F-4D97-AF65-F5344CB8AC3E}">
-        <p14:creationId xmlns:p14="http://schemas.microsoft.com/office/powerpoint/2010/main" val="1389222877"/>
+        <p14:creationId xmlns:p14="http://schemas.microsoft.com/office/powerpoint/2010/main" val="1873090336"/>
       </p:ext>
     </p:extLst>
   </p:cSld>
@@ -15171,6 +15399,24 @@
 </file>
 
 <file path=customXml/item1.xml><?xml version="1.0" encoding="utf-8"?>
+<p:properties xmlns:p="http://schemas.microsoft.com/office/2006/metadata/properties" xmlns:xsi="http://www.w3.org/2001/XMLSchema-instance" xmlns:pc="http://schemas.microsoft.com/office/infopath/2007/PartnerControls">
+  <documentManagement>
+    <Status xmlns="71af3243-3dd4-4a8d-8c0d-dd76da1f02a5">Not started</Status>
+    <MediaServiceKeyPoints xmlns="71af3243-3dd4-4a8d-8c0d-dd76da1f02a5" xsi:nil="true"/>
+  </documentManagement>
+</p:properties>
+</file>
+
+<file path=customXml/item2.xml><?xml version="1.0" encoding="utf-8"?>
+<?mso-contentType ?>
+<FormTemplates xmlns="http://schemas.microsoft.com/sharepoint/v3/contenttype/forms">
+  <Display>DocumentLibraryForm</Display>
+  <Edit>DocumentLibraryForm</Edit>
+  <New>DocumentLibraryForm</New>
+</FormTemplates>
+</file>
+
+<file path=customXml/item3.xml><?xml version="1.0" encoding="utf-8"?>
 <ct:contentTypeSchema xmlns:ct="http://schemas.microsoft.com/office/2006/metadata/contentType" xmlns:ma="http://schemas.microsoft.com/office/2006/metadata/properties/metaAttributes" ct:_="" ma:_="" ma:contentTypeName="Document" ma:contentTypeID="0x01010079F111ED35F8CC479449609E8A0923A6" ma:contentTypeVersion="12" ma:contentTypeDescription="Create a new document." ma:contentTypeScope="" ma:versionID="7f9b5e87859ce6d7eedbdc6e4e4205ca">
   <xsd:schema xmlns:xsd="http://www.w3.org/2001/XMLSchema" xmlns:xs="http://www.w3.org/2001/XMLSchema" xmlns:p="http://schemas.microsoft.com/office/2006/metadata/properties" xmlns:ns2="71af3243-3dd4-4a8d-8c0d-dd76da1f02a5" xmlns:ns3="16c05727-aa75-4e4a-9b5f-8a80a1165891" targetNamespace="http://schemas.microsoft.com/office/2006/metadata/properties" ma:root="true" ma:fieldsID="a5e0075ee7624d6a846e01eb61837427" ns2:_="" ns3:_="">
     <xsd:import namespace="71af3243-3dd4-4a8d-8c0d-dd76da1f02a5"/>
@@ -15391,25 +15637,25 @@
 </ct:contentTypeSchema>
 </file>
 
-<file path=customXml/item2.xml><?xml version="1.0" encoding="utf-8"?>
-<?mso-contentType ?>
-<FormTemplates xmlns="http://schemas.microsoft.com/sharepoint/v3/contenttype/forms">
-  <Display>DocumentLibraryForm</Display>
-  <Edit>DocumentLibraryForm</Edit>
-  <New>DocumentLibraryForm</New>
-</FormTemplates>
+<file path=customXml/itemProps1.xml><?xml version="1.0" encoding="utf-8"?>
+<ds:datastoreItem xmlns:ds="http://schemas.openxmlformats.org/officeDocument/2006/customXml" ds:itemID="{471340EA-4D3D-470F-B5D6-C0F623079401}">
+  <ds:schemaRefs>
+    <ds:schemaRef ds:uri="http://schemas.microsoft.com/office/2006/metadata/properties"/>
+    <ds:schemaRef ds:uri="http://schemas.microsoft.com/office/infopath/2007/PartnerControls"/>
+    <ds:schemaRef ds:uri="71af3243-3dd4-4a8d-8c0d-dd76da1f02a5"/>
+  </ds:schemaRefs>
+</ds:datastoreItem>
 </file>
 
-<file path=customXml/item3.xml><?xml version="1.0" encoding="utf-8"?>
-<p:properties xmlns:p="http://schemas.microsoft.com/office/2006/metadata/properties" xmlns:xsi="http://www.w3.org/2001/XMLSchema-instance" xmlns:pc="http://schemas.microsoft.com/office/infopath/2007/PartnerControls">
-  <documentManagement>
-    <Status xmlns="71af3243-3dd4-4a8d-8c0d-dd76da1f02a5">Not started</Status>
-    <MediaServiceKeyPoints xmlns="71af3243-3dd4-4a8d-8c0d-dd76da1f02a5" xsi:nil="true"/>
-  </documentManagement>
-</p:properties>
+<file path=customXml/itemProps2.xml><?xml version="1.0" encoding="utf-8"?>
+<ds:datastoreItem xmlns:ds="http://schemas.openxmlformats.org/officeDocument/2006/customXml" ds:itemID="{26A0F1FB-B1B3-48EC-BFEE-FC0094A34C28}">
+  <ds:schemaRefs>
+    <ds:schemaRef ds:uri="http://schemas.microsoft.com/sharepoint/v3/contenttype/forms"/>
+  </ds:schemaRefs>
+</ds:datastoreItem>
 </file>
 
-<file path=customXml/itemProps1.xml><?xml version="1.0" encoding="utf-8"?>
+<file path=customXml/itemProps3.xml><?xml version="1.0" encoding="utf-8"?>
 <ds:datastoreItem xmlns:ds="http://schemas.openxmlformats.org/officeDocument/2006/customXml" ds:itemID="{1B834546-CF5A-40F0-B105-33C88EC0593D}">
   <ds:schemaRefs>
     <ds:schemaRef ds:uri="http://schemas.microsoft.com/office/2006/metadata/contentType"/>
@@ -15426,22 +15672,4 @@
     <ds:schemaRef ds:uri="http://schemas.microsoft.com/internal/obd"/>
   </ds:schemaRefs>
 </ds:datastoreItem>
-</file>
-
-<file path=customXml/itemProps2.xml><?xml version="1.0" encoding="utf-8"?>
-<ds:datastoreItem xmlns:ds="http://schemas.openxmlformats.org/officeDocument/2006/customXml" ds:itemID="{26A0F1FB-B1B3-48EC-BFEE-FC0094A34C28}">
-  <ds:schemaRefs>
-    <ds:schemaRef ds:uri="http://schemas.microsoft.com/sharepoint/v3/contenttype/forms"/>
-  </ds:schemaRefs>
-</ds:datastoreItem>
-</file>
-
-<file path=customXml/itemProps3.xml><?xml version="1.0" encoding="utf-8"?>
-<ds:datastoreItem xmlns:ds="http://schemas.openxmlformats.org/officeDocument/2006/customXml" ds:itemID="{471340EA-4D3D-470F-B5D6-C0F623079401}">
-  <ds:schemaRefs>
-    <ds:schemaRef ds:uri="http://schemas.microsoft.com/office/2006/metadata/properties"/>
-    <ds:schemaRef ds:uri="http://schemas.microsoft.com/office/infopath/2007/PartnerControls"/>
-    <ds:schemaRef ds:uri="71af3243-3dd4-4a8d-8c0d-dd76da1f02a5"/>
-  </ds:schemaRefs>
-</ds:datastoreItem>
 </file>
</xml_diff>

<commit_message>
modify infect() method in VirusWithoutEnvelope
</commit_message>
<xml_diff>
--- a/Presentation/presentation.pptx
+++ b/Presentation/presentation.pptx
@@ -227,7 +227,7 @@
           <a:p>
             <a:fld id="{D1CB9CF0-A540-4793-A5F3-F4917CFDDCB6}" type="datetimeFigureOut">
               <a:rPr lang="en-US" smtClean="0"/>
-              <a:t>7/14/2022</a:t>
+              <a:t>7/16/2022</a:t>
             </a:fld>
             <a:endParaRPr lang="en-US" dirty="0"/>
           </a:p>
@@ -404,7 +404,7 @@
           <a:p>
             <a:fld id="{EDA03753-A5BE-4D79-AEA9-C0A65A6F8851}" type="datetimeFigureOut">
               <a:rPr lang="en-US" smtClean="0"/>
-              <a:t>7/14/2022</a:t>
+              <a:t>7/16/2022</a:t>
             </a:fld>
             <a:endParaRPr lang="en-US" dirty="0"/>
           </a:p>
@@ -10759,10 +10759,10 @@
       </p:sp>
       <p:pic>
         <p:nvPicPr>
-          <p:cNvPr id="4" name="Picture 3" descr="A picture containing text&#10;&#10;Description automatically generated">
-            <a:extLst>
-              <a:ext uri="{FF2B5EF4-FFF2-40B4-BE49-F238E27FC236}">
-                <a16:creationId xmlns:a16="http://schemas.microsoft.com/office/drawing/2014/main" id="{CAC63DAD-CFB0-900C-64D8-1C1D3B35AD15}"/>
+          <p:cNvPr id="3" name="Picture 2" descr="A picture containing text&#10;&#10;Description automatically generated">
+            <a:extLst>
+              <a:ext uri="{FF2B5EF4-FFF2-40B4-BE49-F238E27FC236}">
+                <a16:creationId xmlns:a16="http://schemas.microsoft.com/office/drawing/2014/main" id="{3431A668-041D-28E0-AECD-4CABAAC1A343}"/>
               </a:ext>
             </a:extLst>
           </p:cNvPr>
@@ -10779,8 +10779,8 @@
         </p:blipFill>
         <p:spPr>
           <a:xfrm>
-            <a:off x="2171752" y="770980"/>
-            <a:ext cx="7848495" cy="5962731"/>
+            <a:off x="2193044" y="900871"/>
+            <a:ext cx="7805911" cy="5870299"/>
           </a:xfrm>
           <a:prstGeom prst="rect">
             <a:avLst/>
@@ -10918,10 +10918,10 @@
       </p:sp>
       <p:pic>
         <p:nvPicPr>
-          <p:cNvPr id="4" name="Picture 3" descr="A picture containing diagram&#10;&#10;Description automatically generated">
-            <a:extLst>
-              <a:ext uri="{FF2B5EF4-FFF2-40B4-BE49-F238E27FC236}">
-                <a16:creationId xmlns:a16="http://schemas.microsoft.com/office/drawing/2014/main" id="{877F48BD-860A-317C-1687-BCF92D6CA842}"/>
+          <p:cNvPr id="3" name="Picture 2" descr="A picture containing timeline&#10;&#10;Description automatically generated">
+            <a:extLst>
+              <a:ext uri="{FF2B5EF4-FFF2-40B4-BE49-F238E27FC236}">
+                <a16:creationId xmlns:a16="http://schemas.microsoft.com/office/drawing/2014/main" id="{60BAEE5E-F78C-705A-59C5-7DDF6412E332}"/>
               </a:ext>
             </a:extLst>
           </p:cNvPr>
@@ -10938,8 +10938,8 @@
         </p:blipFill>
         <p:spPr>
           <a:xfrm>
-            <a:off x="2417043" y="876300"/>
-            <a:ext cx="7189019" cy="5832056"/>
+            <a:off x="2542011" y="805099"/>
+            <a:ext cx="7107977" cy="5866469"/>
           </a:xfrm>
           <a:prstGeom prst="rect">
             <a:avLst/>
@@ -14341,10 +14341,10 @@
       </p:sp>
       <p:pic>
         <p:nvPicPr>
-          <p:cNvPr id="3" name="Picture 2">
-            <a:extLst>
-              <a:ext uri="{FF2B5EF4-FFF2-40B4-BE49-F238E27FC236}">
-                <a16:creationId xmlns:a16="http://schemas.microsoft.com/office/drawing/2014/main" id="{B0C6DF80-9B91-CCA4-957F-1C7437EAF853}"/>
+          <p:cNvPr id="4" name="Picture 3">
+            <a:extLst>
+              <a:ext uri="{FF2B5EF4-FFF2-40B4-BE49-F238E27FC236}">
+                <a16:creationId xmlns:a16="http://schemas.microsoft.com/office/drawing/2014/main" id="{A9D93836-6079-F895-0938-EB425A555DA9}"/>
               </a:ext>
             </a:extLst>
           </p:cNvPr>
@@ -14361,8 +14361,8 @@
         </p:blipFill>
         <p:spPr>
           <a:xfrm>
-            <a:off x="2488348" y="1011373"/>
-            <a:ext cx="7497221" cy="5525271"/>
+            <a:off x="3520445" y="876300"/>
+            <a:ext cx="4992047" cy="5691625"/>
           </a:xfrm>
           <a:prstGeom prst="rect">
             <a:avLst/>
@@ -15325,24 +15325,6 @@
 </file>
 
 <file path=customXml/item1.xml><?xml version="1.0" encoding="utf-8"?>
-<?mso-contentType ?>
-<FormTemplates xmlns="http://schemas.microsoft.com/sharepoint/v3/contenttype/forms">
-  <Display>DocumentLibraryForm</Display>
-  <Edit>DocumentLibraryForm</Edit>
-  <New>DocumentLibraryForm</New>
-</FormTemplates>
-</file>
-
-<file path=customXml/item2.xml><?xml version="1.0" encoding="utf-8"?>
-<p:properties xmlns:p="http://schemas.microsoft.com/office/2006/metadata/properties" xmlns:xsi="http://www.w3.org/2001/XMLSchema-instance" xmlns:pc="http://schemas.microsoft.com/office/infopath/2007/PartnerControls">
-  <documentManagement>
-    <Status xmlns="71af3243-3dd4-4a8d-8c0d-dd76da1f02a5">Not started</Status>
-    <MediaServiceKeyPoints xmlns="71af3243-3dd4-4a8d-8c0d-dd76da1f02a5" xsi:nil="true"/>
-  </documentManagement>
-</p:properties>
-</file>
-
-<file path=customXml/item3.xml><?xml version="1.0" encoding="utf-8"?>
 <ct:contentTypeSchema xmlns:ct="http://schemas.microsoft.com/office/2006/metadata/contentType" xmlns:ma="http://schemas.microsoft.com/office/2006/metadata/properties/metaAttributes" ct:_="" ma:_="" ma:contentTypeName="Document" ma:contentTypeID="0x01010079F111ED35F8CC479449609E8A0923A6" ma:contentTypeVersion="12" ma:contentTypeDescription="Create a new document." ma:contentTypeScope="" ma:versionID="7f9b5e87859ce6d7eedbdc6e4e4205ca">
   <xsd:schema xmlns:xsd="http://www.w3.org/2001/XMLSchema" xmlns:xs="http://www.w3.org/2001/XMLSchema" xmlns:p="http://schemas.microsoft.com/office/2006/metadata/properties" xmlns:ns2="71af3243-3dd4-4a8d-8c0d-dd76da1f02a5" xmlns:ns3="16c05727-aa75-4e4a-9b5f-8a80a1165891" targetNamespace="http://schemas.microsoft.com/office/2006/metadata/properties" ma:root="true" ma:fieldsID="a5e0075ee7624d6a846e01eb61837427" ns2:_="" ns3:_="">
     <xsd:import namespace="71af3243-3dd4-4a8d-8c0d-dd76da1f02a5"/>
@@ -15563,25 +15545,25 @@
 </ct:contentTypeSchema>
 </file>
 
-<file path=customXml/itemProps1.xml><?xml version="1.0" encoding="utf-8"?>
-<ds:datastoreItem xmlns:ds="http://schemas.openxmlformats.org/officeDocument/2006/customXml" ds:itemID="{26A0F1FB-B1B3-48EC-BFEE-FC0094A34C28}">
-  <ds:schemaRefs>
-    <ds:schemaRef ds:uri="http://schemas.microsoft.com/sharepoint/v3/contenttype/forms"/>
-  </ds:schemaRefs>
-</ds:datastoreItem>
+<file path=customXml/item2.xml><?xml version="1.0" encoding="utf-8"?>
+<p:properties xmlns:p="http://schemas.microsoft.com/office/2006/metadata/properties" xmlns:xsi="http://www.w3.org/2001/XMLSchema-instance" xmlns:pc="http://schemas.microsoft.com/office/infopath/2007/PartnerControls">
+  <documentManagement>
+    <Status xmlns="71af3243-3dd4-4a8d-8c0d-dd76da1f02a5">Not started</Status>
+    <MediaServiceKeyPoints xmlns="71af3243-3dd4-4a8d-8c0d-dd76da1f02a5" xsi:nil="true"/>
+  </documentManagement>
+</p:properties>
 </file>
 
-<file path=customXml/itemProps2.xml><?xml version="1.0" encoding="utf-8"?>
-<ds:datastoreItem xmlns:ds="http://schemas.openxmlformats.org/officeDocument/2006/customXml" ds:itemID="{471340EA-4D3D-470F-B5D6-C0F623079401}">
-  <ds:schemaRefs>
-    <ds:schemaRef ds:uri="http://schemas.microsoft.com/office/2006/metadata/properties"/>
-    <ds:schemaRef ds:uri="http://schemas.microsoft.com/office/infopath/2007/PartnerControls"/>
-    <ds:schemaRef ds:uri="71af3243-3dd4-4a8d-8c0d-dd76da1f02a5"/>
-  </ds:schemaRefs>
-</ds:datastoreItem>
+<file path=customXml/item3.xml><?xml version="1.0" encoding="utf-8"?>
+<?mso-contentType ?>
+<FormTemplates xmlns="http://schemas.microsoft.com/sharepoint/v3/contenttype/forms">
+  <Display>DocumentLibraryForm</Display>
+  <Edit>DocumentLibraryForm</Edit>
+  <New>DocumentLibraryForm</New>
+</FormTemplates>
 </file>
 
-<file path=customXml/itemProps3.xml><?xml version="1.0" encoding="utf-8"?>
+<file path=customXml/itemProps1.xml><?xml version="1.0" encoding="utf-8"?>
 <ds:datastoreItem xmlns:ds="http://schemas.openxmlformats.org/officeDocument/2006/customXml" ds:itemID="{1B834546-CF5A-40F0-B105-33C88EC0593D}">
   <ds:schemaRefs>
     <ds:schemaRef ds:uri="http://schemas.microsoft.com/office/2006/metadata/contentType"/>
@@ -15598,4 +15580,22 @@
     <ds:schemaRef ds:uri="http://schemas.microsoft.com/internal/obd"/>
   </ds:schemaRefs>
 </ds:datastoreItem>
+</file>
+
+<file path=customXml/itemProps2.xml><?xml version="1.0" encoding="utf-8"?>
+<ds:datastoreItem xmlns:ds="http://schemas.openxmlformats.org/officeDocument/2006/customXml" ds:itemID="{471340EA-4D3D-470F-B5D6-C0F623079401}">
+  <ds:schemaRefs>
+    <ds:schemaRef ds:uri="http://schemas.microsoft.com/office/2006/metadata/properties"/>
+    <ds:schemaRef ds:uri="http://schemas.microsoft.com/office/infopath/2007/PartnerControls"/>
+    <ds:schemaRef ds:uri="71af3243-3dd4-4a8d-8c0d-dd76da1f02a5"/>
+  </ds:schemaRefs>
+</ds:datastoreItem>
+</file>
+
+<file path=customXml/itemProps3.xml><?xml version="1.0" encoding="utf-8"?>
+<ds:datastoreItem xmlns:ds="http://schemas.openxmlformats.org/officeDocument/2006/customXml" ds:itemID="{26A0F1FB-B1B3-48EC-BFEE-FC0094A34C28}">
+  <ds:schemaRefs>
+    <ds:schemaRef ds:uri="http://schemas.microsoft.com/sharepoint/v3/contenttype/forms"/>
+  </ds:schemaRefs>
+</ds:datastoreItem>
 </file>
</xml_diff>